<commit_message>
Criado servidor http para testes no Front
</commit_message>
<xml_diff>
--- a/SlideTreinamentoAngular2.pptx
+++ b/SlideTreinamentoAngular2.pptx
@@ -10,8 +10,9 @@
     <p:sldId id="258" r:id="rId4"/>
     <p:sldId id="259" r:id="rId5"/>
     <p:sldId id="261" r:id="rId6"/>
-    <p:sldId id="260" r:id="rId7"/>
-    <p:sldId id="262" r:id="rId8"/>
+    <p:sldId id="263" r:id="rId7"/>
+    <p:sldId id="260" r:id="rId8"/>
+    <p:sldId id="262" r:id="rId9"/>
   </p:sldIdLst>
   <p:sldSz cx="12192000" cy="6858000"/>
   <p:notesSz cx="6858000" cy="9144000"/>
@@ -249,7 +250,7 @@
           <a:p>
             <a:fld id="{FDAD9090-CCEC-405F-8D02-320FDDD28DE3}" type="datetimeFigureOut">
               <a:rPr lang="pt-BR" smtClean="0"/>
-              <a:t>20/09/2016</a:t>
+              <a:t>26/09/2016</a:t>
             </a:fld>
             <a:endParaRPr lang="pt-BR"/>
           </a:p>
@@ -419,7 +420,7 @@
           <a:p>
             <a:fld id="{FDAD9090-CCEC-405F-8D02-320FDDD28DE3}" type="datetimeFigureOut">
               <a:rPr lang="pt-BR" smtClean="0"/>
-              <a:t>20/09/2016</a:t>
+              <a:t>26/09/2016</a:t>
             </a:fld>
             <a:endParaRPr lang="pt-BR"/>
           </a:p>
@@ -599,7 +600,7 @@
           <a:p>
             <a:fld id="{FDAD9090-CCEC-405F-8D02-320FDDD28DE3}" type="datetimeFigureOut">
               <a:rPr lang="pt-BR" smtClean="0"/>
-              <a:t>20/09/2016</a:t>
+              <a:t>26/09/2016</a:t>
             </a:fld>
             <a:endParaRPr lang="pt-BR"/>
           </a:p>
@@ -769,7 +770,7 @@
           <a:p>
             <a:fld id="{FDAD9090-CCEC-405F-8D02-320FDDD28DE3}" type="datetimeFigureOut">
               <a:rPr lang="pt-BR" smtClean="0"/>
-              <a:t>20/09/2016</a:t>
+              <a:t>26/09/2016</a:t>
             </a:fld>
             <a:endParaRPr lang="pt-BR"/>
           </a:p>
@@ -1015,7 +1016,7 @@
           <a:p>
             <a:fld id="{FDAD9090-CCEC-405F-8D02-320FDDD28DE3}" type="datetimeFigureOut">
               <a:rPr lang="pt-BR" smtClean="0"/>
-              <a:t>20/09/2016</a:t>
+              <a:t>26/09/2016</a:t>
             </a:fld>
             <a:endParaRPr lang="pt-BR"/>
           </a:p>
@@ -1247,7 +1248,7 @@
           <a:p>
             <a:fld id="{FDAD9090-CCEC-405F-8D02-320FDDD28DE3}" type="datetimeFigureOut">
               <a:rPr lang="pt-BR" smtClean="0"/>
-              <a:t>20/09/2016</a:t>
+              <a:t>26/09/2016</a:t>
             </a:fld>
             <a:endParaRPr lang="pt-BR"/>
           </a:p>
@@ -1614,7 +1615,7 @@
           <a:p>
             <a:fld id="{FDAD9090-CCEC-405F-8D02-320FDDD28DE3}" type="datetimeFigureOut">
               <a:rPr lang="pt-BR" smtClean="0"/>
-              <a:t>20/09/2016</a:t>
+              <a:t>26/09/2016</a:t>
             </a:fld>
             <a:endParaRPr lang="pt-BR"/>
           </a:p>
@@ -1732,7 +1733,7 @@
           <a:p>
             <a:fld id="{FDAD9090-CCEC-405F-8D02-320FDDD28DE3}" type="datetimeFigureOut">
               <a:rPr lang="pt-BR" smtClean="0"/>
-              <a:t>20/09/2016</a:t>
+              <a:t>26/09/2016</a:t>
             </a:fld>
             <a:endParaRPr lang="pt-BR"/>
           </a:p>
@@ -1827,7 +1828,7 @@
           <a:p>
             <a:fld id="{FDAD9090-CCEC-405F-8D02-320FDDD28DE3}" type="datetimeFigureOut">
               <a:rPr lang="pt-BR" smtClean="0"/>
-              <a:t>20/09/2016</a:t>
+              <a:t>26/09/2016</a:t>
             </a:fld>
             <a:endParaRPr lang="pt-BR"/>
           </a:p>
@@ -2104,7 +2105,7 @@
           <a:p>
             <a:fld id="{FDAD9090-CCEC-405F-8D02-320FDDD28DE3}" type="datetimeFigureOut">
               <a:rPr lang="pt-BR" smtClean="0"/>
-              <a:t>20/09/2016</a:t>
+              <a:t>26/09/2016</a:t>
             </a:fld>
             <a:endParaRPr lang="pt-BR"/>
           </a:p>
@@ -2357,7 +2358,7 @@
           <a:p>
             <a:fld id="{FDAD9090-CCEC-405F-8D02-320FDDD28DE3}" type="datetimeFigureOut">
               <a:rPr lang="pt-BR" smtClean="0"/>
-              <a:t>20/09/2016</a:t>
+              <a:t>26/09/2016</a:t>
             </a:fld>
             <a:endParaRPr lang="pt-BR"/>
           </a:p>
@@ -2570,7 +2571,7 @@
           <a:p>
             <a:fld id="{FDAD9090-CCEC-405F-8D02-320FDDD28DE3}" type="datetimeFigureOut">
               <a:rPr lang="pt-BR" smtClean="0"/>
-              <a:t>20/09/2016</a:t>
+              <a:t>26/09/2016</a:t>
             </a:fld>
             <a:endParaRPr lang="pt-BR"/>
           </a:p>
@@ -3611,7 +3612,7 @@
                 </a:solidFill>
                 <a:latin typeface="Lucida Console" panose="020B0609040504020204" pitchFamily="49" charset="0"/>
               </a:rPr>
-              <a:t>Módulo</a:t>
+              <a:t>Módulos</a:t>
             </a:r>
           </a:p>
           <a:p>
@@ -3758,6 +3759,137 @@
 </file>
 
 <file path=ppt/slides/slide6.xml><?xml version="1.0" encoding="utf-8"?>
+<p:sld xmlns:a="http://schemas.openxmlformats.org/drawingml/2006/main" xmlns:r="http://schemas.openxmlformats.org/officeDocument/2006/relationships" xmlns:p="http://schemas.openxmlformats.org/presentationml/2006/main">
+  <p:cSld>
+    <p:bg>
+      <p:bgPr>
+        <a:solidFill>
+          <a:srgbClr val="0143A3"/>
+        </a:solidFill>
+        <a:effectLst/>
+      </p:bgPr>
+    </p:bg>
+    <p:spTree>
+      <p:nvGrpSpPr>
+        <p:cNvPr id="1" name=""/>
+        <p:cNvGrpSpPr/>
+        <p:nvPr/>
+      </p:nvGrpSpPr>
+      <p:grpSpPr>
+        <a:xfrm>
+          <a:off x="0" y="0"/>
+          <a:ext cx="0" cy="0"/>
+          <a:chOff x="0" y="0"/>
+          <a:chExt cx="0" cy="0"/>
+        </a:xfrm>
+      </p:grpSpPr>
+      <p:sp>
+        <p:nvSpPr>
+          <p:cNvPr id="3" name="Subtitle 2"/>
+          <p:cNvSpPr>
+            <a:spLocks noGrp="1"/>
+          </p:cNvSpPr>
+          <p:nvPr>
+            <p:ph type="subTitle" idx="1"/>
+          </p:nvPr>
+        </p:nvSpPr>
+        <p:spPr>
+          <a:xfrm>
+            <a:off x="1527516" y="1757289"/>
+            <a:ext cx="9144000" cy="4044927"/>
+          </a:xfrm>
+        </p:spPr>
+        <p:txBody>
+          <a:bodyPr>
+            <a:normAutofit/>
+          </a:bodyPr>
+          <a:lstStyle/>
+          <a:p>
+            <a:pPr algn="l"/>
+            <a:r>
+              <a:rPr lang="pt-BR" sz="2800" b="1" dirty="0">
+                <a:solidFill>
+                  <a:schemeClr val="bg1"/>
+                </a:solidFill>
+                <a:latin typeface="Lucida Console" panose="020B0609040504020204" pitchFamily="49" charset="0"/>
+              </a:rPr>
+              <a:t>	 Ciclo de vida dos componentes</a:t>
+            </a:r>
+          </a:p>
+        </p:txBody>
+      </p:sp>
+      <p:pic>
+        <p:nvPicPr>
+          <p:cNvPr id="5" name="Picture 4"/>
+          <p:cNvPicPr>
+            <a:picLocks noChangeAspect="1"/>
+          </p:cNvPicPr>
+          <p:nvPr/>
+        </p:nvPicPr>
+        <p:blipFill rotWithShape="1">
+          <a:blip r:embed="rId2">
+            <a:extLst>
+              <a:ext uri="{28A0092B-C50C-407E-A947-70E740481C1C}">
+                <a14:useLocalDpi xmlns:a14="http://schemas.microsoft.com/office/drawing/2010/main" val="0"/>
+              </a:ext>
+            </a:extLst>
+          </a:blip>
+          <a:srcRect l="1900" t="6074" r="2936" b="34349"/>
+          <a:stretch/>
+        </p:blipFill>
+        <p:spPr>
+          <a:xfrm>
+            <a:off x="1" y="182880"/>
+            <a:ext cx="4951828" cy="1406769"/>
+          </a:xfrm>
+          <a:prstGeom prst="rect">
+            <a:avLst/>
+          </a:prstGeom>
+        </p:spPr>
+      </p:pic>
+      <p:pic>
+        <p:nvPicPr>
+          <p:cNvPr id="10" name="Picture 9" descr="Curso Angular 2 #15: Ciclo de vida (life-cycle) do Componente - YouTube - Google Chrome"/>
+          <p:cNvPicPr>
+            <a:picLocks noChangeAspect="1"/>
+          </p:cNvPicPr>
+          <p:nvPr/>
+        </p:nvPicPr>
+        <p:blipFill rotWithShape="1">
+          <a:blip r:embed="rId3">
+            <a:extLst>
+              <a:ext uri="{28A0092B-C50C-407E-A947-70E740481C1C}">
+                <a14:useLocalDpi xmlns:a14="http://schemas.microsoft.com/office/drawing/2010/main" val="0"/>
+              </a:ext>
+            </a:extLst>
+          </a:blip>
+          <a:srcRect l="8222" t="24889" r="8222" b="16130"/>
+          <a:stretch/>
+        </p:blipFill>
+        <p:spPr>
+          <a:xfrm>
+            <a:off x="1239714" y="2301240"/>
+            <a:ext cx="9719604" cy="4280095"/>
+          </a:xfrm>
+          <a:prstGeom prst="rect">
+            <a:avLst/>
+          </a:prstGeom>
+        </p:spPr>
+      </p:pic>
+    </p:spTree>
+    <p:extLst>
+      <p:ext uri="{BB962C8B-B14F-4D97-AF65-F5344CB8AC3E}">
+        <p14:creationId xmlns:p14="http://schemas.microsoft.com/office/powerpoint/2010/main" val="4024159074"/>
+      </p:ext>
+    </p:extLst>
+  </p:cSld>
+  <p:clrMapOvr>
+    <a:masterClrMapping/>
+  </p:clrMapOvr>
+</p:sld>
+</file>
+
+<file path=ppt/slides/slide7.xml><?xml version="1.0" encoding="utf-8"?>
 <p:sld xmlns:a="http://schemas.openxmlformats.org/drawingml/2006/main" xmlns:r="http://schemas.openxmlformats.org/officeDocument/2006/relationships" xmlns:p="http://schemas.openxmlformats.org/presentationml/2006/main">
   <p:cSld>
     <p:bg>
@@ -3886,7 +4018,7 @@
 </p:sld>
 </file>
 
-<file path=ppt/slides/slide7.xml><?xml version="1.0" encoding="utf-8"?>
+<file path=ppt/slides/slide8.xml><?xml version="1.0" encoding="utf-8"?>
 <p:sld xmlns:a="http://schemas.openxmlformats.org/drawingml/2006/main" xmlns:r="http://schemas.openxmlformats.org/officeDocument/2006/relationships" xmlns:p="http://schemas.openxmlformats.org/presentationml/2006/main">
   <p:cSld>
     <p:bg>
@@ -3941,7 +4073,22 @@
                 </a:solidFill>
                 <a:latin typeface="Lucida Console" panose="020B0609040504020204" pitchFamily="49" charset="0"/>
               </a:rPr>
-              <a:t>Aula 2</a:t>
+              <a:t>Aula 3</a:t>
+            </a:r>
+          </a:p>
+          <a:p>
+            <a:pPr marL="457200" indent="-457200" algn="l">
+              <a:buFont typeface="Arial" panose="020B0604020202020204" pitchFamily="34" charset="0"/>
+              <a:buChar char="•"/>
+            </a:pPr>
+            <a:r>
+              <a:rPr lang="pt-BR" sz="2800" b="1" dirty="0">
+                <a:solidFill>
+                  <a:schemeClr val="bg1"/>
+                </a:solidFill>
+                <a:latin typeface="Lucida Console" panose="020B0609040504020204" pitchFamily="49" charset="0"/>
+              </a:rPr>
+              <a:t>Operações em Array. Incluir,excluir,alterar.</a:t>
             </a:r>
           </a:p>
           <a:p>
@@ -3971,8 +4118,62 @@
                 </a:solidFill>
                 <a:latin typeface="Lucida Console" panose="020B0609040504020204" pitchFamily="49" charset="0"/>
               </a:rPr>
-              <a:t>Definição dos providers</a:t>
-            </a:r>
+              <a:t>Criação do método getParticipantes</a:t>
+            </a:r>
+          </a:p>
+          <a:p>
+            <a:pPr marL="457200" indent="-457200" algn="l">
+              <a:buFont typeface="Arial" panose="020B0604020202020204" pitchFamily="34" charset="0"/>
+              <a:buChar char="•"/>
+            </a:pPr>
+            <a:r>
+              <a:rPr lang="pt-BR" sz="2800" b="1" dirty="0">
+                <a:solidFill>
+                  <a:schemeClr val="bg1"/>
+                </a:solidFill>
+                <a:latin typeface="Lucida Console" panose="020B0609040504020204" pitchFamily="49" charset="0"/>
+              </a:rPr>
+              <a:t>Injection</a:t>
+            </a:r>
+          </a:p>
+          <a:p>
+            <a:pPr marL="457200" indent="-457200" algn="l">
+              <a:buFont typeface="Arial" panose="020B0604020202020204" pitchFamily="34" charset="0"/>
+              <a:buChar char="•"/>
+            </a:pPr>
+            <a:r>
+              <a:rPr lang="pt-BR" sz="2800" b="1" dirty="0">
+                <a:solidFill>
+                  <a:schemeClr val="bg1"/>
+                </a:solidFill>
+                <a:latin typeface="Lucida Console" panose="020B0609040504020204" pitchFamily="49" charset="0"/>
+              </a:rPr>
+              <a:t>Providers</a:t>
+            </a:r>
+          </a:p>
+          <a:p>
+            <a:pPr marL="457200" indent="-457200" algn="l">
+              <a:buFont typeface="Arial" panose="020B0604020202020204" pitchFamily="34" charset="0"/>
+              <a:buChar char="•"/>
+            </a:pPr>
+            <a:endParaRPr lang="pt-BR" sz="2800" b="1" dirty="0">
+              <a:solidFill>
+                <a:schemeClr val="bg1"/>
+              </a:solidFill>
+              <a:latin typeface="Lucida Console" panose="020B0609040504020204" pitchFamily="49" charset="0"/>
+            </a:endParaRPr>
+          </a:p>
+          <a:p>
+            <a:pPr marL="457200" indent="-457200" algn="l">
+              <a:buFont typeface="Arial" panose="020B0604020202020204" pitchFamily="34" charset="0"/>
+              <a:buChar char="•"/>
+            </a:pPr>
+            <a:endParaRPr lang="pt-BR" sz="2800" b="1" dirty="0">
+              <a:solidFill>
+                <a:schemeClr val="bg1"/>
+              </a:solidFill>
+              <a:latin typeface="Lucida Console" panose="020B0609040504020204" pitchFamily="49" charset="0"/>
+            </a:endParaRPr>
           </a:p>
           <a:p>
             <a:pPr marL="457200" indent="-457200" algn="l">

</xml_diff>